<commit_message>
Major updates: See NEWS.md
</commit_message>
<xml_diff>
--- a/slides/chap2_exploration.pptx
+++ b/slides/chap2_exploration.pptx
@@ -9907,7 +9907,22 @@
                   <a:schemeClr val="bg1"/>
                 </a:solidFill>
               </a:rPr>
-              <a:t>Introduction to Data Mining </a:t>
+              <a:t>Introduction to</a:t>
+            </a:r>
+            <a:br>
+              <a:rPr lang="en-US" altLang="en-US" sz="2900" b="1" dirty="0">
+                <a:solidFill>
+                  <a:schemeClr val="bg1"/>
+                </a:solidFill>
+              </a:rPr>
+            </a:br>
+            <a:r>
+              <a:rPr lang="en-US" altLang="en-US" sz="2900" b="1" dirty="0">
+                <a:solidFill>
+                  <a:schemeClr val="bg1"/>
+                </a:solidFill>
+              </a:rPr>
+              <a:t>Data Mining </a:t>
             </a:r>
             <a:br>
               <a:rPr lang="en-US" altLang="en-US" sz="2900" dirty="0">
@@ -9936,7 +9951,15 @@
                   <a:schemeClr val="bg1"/>
                 </a:solidFill>
               </a:rPr>
-              <a:t>Chapter 3 </a:t>
+              <a:t>Chapter 2 (</a:t>
+            </a:r>
+            <a:r>
+              <a:rPr lang="en-US" altLang="en-US" sz="2900">
+                <a:solidFill>
+                  <a:schemeClr val="bg1"/>
+                </a:solidFill>
+              </a:rPr>
+              <a:t>addl)</a:t>
             </a:r>
             <a:br>
               <a:rPr lang="en-US" altLang="en-US" sz="2900" dirty="0">
@@ -10022,15 +10045,7 @@
                   <a:schemeClr val="bg1"/>
                 </a:solidFill>
               </a:rPr>
-              <a:t>Based in Slides by </a:t>
-            </a:r>
-            <a:r>
-              <a:rPr lang="en-US" sz="1700" dirty="0" err="1">
-                <a:solidFill>
-                  <a:schemeClr val="bg1"/>
-                </a:solidFill>
-              </a:rPr>
-              <a:t>by</a:t>
+              <a:t>Based in Slides </a:t>
             </a:r>
             <a:r>
               <a:rPr lang="en-US" sz="1700" dirty="0">
@@ -10038,7 +10053,7 @@
                   <a:schemeClr val="bg1"/>
                 </a:solidFill>
               </a:rPr>
-              <a:t> Tan, Steinbach, </a:t>
+              <a:t>by Tan, Steinbach, </a:t>
             </a:r>
             <a:r>
               <a:rPr lang="en-US" sz="1700" dirty="0" err="1">

</xml_diff>

<commit_message>
Added section on scaling issues to clustering.
</commit_message>
<xml_diff>
--- a/slides/chap2_exploration.pptx
+++ b/slides/chap2_exploration.pptx
@@ -11523,7 +11523,7 @@
           <a:p>
             <a:fld id="{AEE3A5ED-0979-46C2-BDB3-6C1F641153D0}" type="datetimeFigureOut">
               <a:rPr lang="en-US" smtClean="0"/>
-              <a:t>2/24/2025</a:t>
+              <a:t>2/26/2025</a:t>
             </a:fld>
             <a:endParaRPr lang="en-US"/>
           </a:p>
@@ -11721,7 +11721,7 @@
           <a:p>
             <a:fld id="{AEE3A5ED-0979-46C2-BDB3-6C1F641153D0}" type="datetimeFigureOut">
               <a:rPr lang="en-US" smtClean="0"/>
-              <a:t>2/24/2025</a:t>
+              <a:t>2/26/2025</a:t>
             </a:fld>
             <a:endParaRPr lang="en-US"/>
           </a:p>
@@ -11929,7 +11929,7 @@
           <a:p>
             <a:fld id="{AEE3A5ED-0979-46C2-BDB3-6C1F641153D0}" type="datetimeFigureOut">
               <a:rPr lang="en-US" smtClean="0"/>
-              <a:t>2/24/2025</a:t>
+              <a:t>2/26/2025</a:t>
             </a:fld>
             <a:endParaRPr lang="en-US"/>
           </a:p>
@@ -12829,7 +12829,7 @@
           <a:p>
             <a:fld id="{AEE3A5ED-0979-46C2-BDB3-6C1F641153D0}" type="datetimeFigureOut">
               <a:rPr lang="en-US" smtClean="0"/>
-              <a:t>2/24/2025</a:t>
+              <a:t>2/26/2025</a:t>
             </a:fld>
             <a:endParaRPr lang="en-US"/>
           </a:p>
@@ -13104,7 +13104,7 @@
           <a:p>
             <a:fld id="{AEE3A5ED-0979-46C2-BDB3-6C1F641153D0}" type="datetimeFigureOut">
               <a:rPr lang="en-US" smtClean="0"/>
-              <a:t>2/24/2025</a:t>
+              <a:t>2/26/2025</a:t>
             </a:fld>
             <a:endParaRPr lang="en-US"/>
           </a:p>
@@ -13369,7 +13369,7 @@
           <a:p>
             <a:fld id="{AEE3A5ED-0979-46C2-BDB3-6C1F641153D0}" type="datetimeFigureOut">
               <a:rPr lang="en-US" smtClean="0"/>
-              <a:t>2/24/2025</a:t>
+              <a:t>2/26/2025</a:t>
             </a:fld>
             <a:endParaRPr lang="en-US"/>
           </a:p>
@@ -13781,7 +13781,7 @@
           <a:p>
             <a:fld id="{AEE3A5ED-0979-46C2-BDB3-6C1F641153D0}" type="datetimeFigureOut">
               <a:rPr lang="en-US" smtClean="0"/>
-              <a:t>2/24/2025</a:t>
+              <a:t>2/26/2025</a:t>
             </a:fld>
             <a:endParaRPr lang="en-US"/>
           </a:p>
@@ -13922,7 +13922,7 @@
           <a:p>
             <a:fld id="{AEE3A5ED-0979-46C2-BDB3-6C1F641153D0}" type="datetimeFigureOut">
               <a:rPr lang="en-US" smtClean="0"/>
-              <a:t>2/24/2025</a:t>
+              <a:t>2/26/2025</a:t>
             </a:fld>
             <a:endParaRPr lang="en-US"/>
           </a:p>
@@ -14035,7 +14035,7 @@
           <a:p>
             <a:fld id="{AEE3A5ED-0979-46C2-BDB3-6C1F641153D0}" type="datetimeFigureOut">
               <a:rPr lang="en-US" smtClean="0"/>
-              <a:t>2/24/2025</a:t>
+              <a:t>2/26/2025</a:t>
             </a:fld>
             <a:endParaRPr lang="en-US"/>
           </a:p>
@@ -14346,7 +14346,7 @@
           <a:p>
             <a:fld id="{AEE3A5ED-0979-46C2-BDB3-6C1F641153D0}" type="datetimeFigureOut">
               <a:rPr lang="en-US" smtClean="0"/>
-              <a:t>2/24/2025</a:t>
+              <a:t>2/26/2025</a:t>
             </a:fld>
             <a:endParaRPr lang="en-US"/>
           </a:p>
@@ -14634,7 +14634,7 @@
           <a:p>
             <a:fld id="{AEE3A5ED-0979-46C2-BDB3-6C1F641153D0}" type="datetimeFigureOut">
               <a:rPr lang="en-US" smtClean="0"/>
-              <a:t>2/24/2025</a:t>
+              <a:t>2/26/2025</a:t>
             </a:fld>
             <a:endParaRPr lang="en-US"/>
           </a:p>
@@ -14875,7 +14875,7 @@
           <a:p>
             <a:fld id="{AEE3A5ED-0979-46C2-BDB3-6C1F641153D0}" type="datetimeFigureOut">
               <a:rPr lang="en-US" smtClean="0"/>
-              <a:t>2/24/2025</a:t>
+              <a:t>2/26/2025</a:t>
             </a:fld>
             <a:endParaRPr lang="en-US"/>
           </a:p>
@@ -15861,141 +15861,161 @@
           </a:p>
         </p:txBody>
       </p:sp>
-      <p:pic>
-        <p:nvPicPr>
-          <p:cNvPr id="3" name="Picture 4" descr="Creative Commons License">
+      <p:grpSp>
+        <p:nvGrpSpPr>
+          <p:cNvPr id="5" name="Group 4">
             <a:extLst>
               <a:ext uri="{FF2B5EF4-FFF2-40B4-BE49-F238E27FC236}">
-                <a16:creationId xmlns:a16="http://schemas.microsoft.com/office/drawing/2014/main" id="{3D155F94-C047-8CEE-2E27-3047EEFD060E}"/>
+                <a16:creationId xmlns:a16="http://schemas.microsoft.com/office/drawing/2014/main" id="{F25D312E-41E3-F1FA-3832-771F49035CD0}"/>
               </a:ext>
             </a:extLst>
           </p:cNvPr>
-          <p:cNvPicPr>
-            <a:picLocks noChangeAspect="1" noChangeArrowheads="1"/>
-          </p:cNvPicPr>
+          <p:cNvGrpSpPr/>
           <p:nvPr/>
-        </p:nvPicPr>
-        <p:blipFill>
-          <a:blip r:embed="rId4">
-            <a:extLst>
-              <a:ext uri="{28A0092B-C50C-407E-A947-70E740481C1C}">
-                <a14:useLocalDpi xmlns:a14="http://schemas.microsoft.com/office/drawing/2010/main" val="0"/>
-              </a:ext>
-            </a:extLst>
-          </a:blip>
-          <a:srcRect/>
-          <a:stretch>
-            <a:fillRect/>
-          </a:stretch>
-        </p:blipFill>
-        <p:spPr bwMode="auto">
+        </p:nvGrpSpPr>
+        <p:grpSpPr>
           <a:xfrm>
-            <a:off x="468312" y="6281489"/>
-            <a:ext cx="838200" cy="295275"/>
+            <a:off x="468312" y="6172200"/>
+            <a:ext cx="3817729" cy="430887"/>
+            <a:chOff x="468312" y="6172200"/>
+            <a:chExt cx="3817729" cy="430887"/>
           </a:xfrm>
-          <a:prstGeom prst="rect">
-            <a:avLst/>
-          </a:prstGeom>
-          <a:noFill/>
-          <a:extLst>
-            <a:ext uri="{909E8E84-426E-40DD-AFC4-6F175D3DCCD1}">
-              <a14:hiddenFill xmlns:a14="http://schemas.microsoft.com/office/drawing/2010/main">
-                <a:solidFill>
-                  <a:srgbClr val="FFFFFF"/>
-                </a:solidFill>
-              </a14:hiddenFill>
-            </a:ext>
-          </a:extLst>
-        </p:spPr>
-      </p:pic>
-      <p:sp>
-        <p:nvSpPr>
-          <p:cNvPr id="4" name="TextBox 3">
-            <a:extLst>
-              <a:ext uri="{FF2B5EF4-FFF2-40B4-BE49-F238E27FC236}">
-                <a16:creationId xmlns:a16="http://schemas.microsoft.com/office/drawing/2014/main" id="{8817F148-9C6D-7783-69AB-3A3B6F5E2CAD}"/>
-              </a:ext>
-            </a:extLst>
-          </p:cNvPr>
-          <p:cNvSpPr txBox="1"/>
-          <p:nvPr/>
-        </p:nvSpPr>
-        <p:spPr>
-          <a:xfrm>
-            <a:off x="1268520" y="6172200"/>
-            <a:ext cx="3017521" cy="430887"/>
-          </a:xfrm>
-          <a:prstGeom prst="rect">
-            <a:avLst/>
-          </a:prstGeom>
-          <a:noFill/>
-        </p:spPr>
-        <p:txBody>
-          <a:bodyPr wrap="square">
-            <a:spAutoFit/>
-          </a:bodyPr>
-          <a:lstStyle/>
-          <a:p>
-            <a:pPr>
-              <a:spcAft>
-                <a:spcPts val="600"/>
-              </a:spcAft>
-            </a:pPr>
-            <a:r>
-              <a:rPr lang="en-US" sz="1100" dirty="0">
-                <a:latin typeface="source sans pro" panose="020B0503030403020204" pitchFamily="34" charset="0"/>
-              </a:rPr>
-              <a:t>This work is licensed under a </a:t>
-            </a:r>
-            <a:r>
-              <a:rPr lang="en-US" sz="1100" dirty="0">
-                <a:latin typeface="source sans pro" panose="020B0503030403020204" pitchFamily="34" charset="0"/>
-                <a:hlinkClick r:id="rId5">
-                  <a:extLst>
-                    <a:ext uri="{A12FA001-AC4F-418D-AE19-62706E023703}">
-                      <ahyp:hlinkClr xmlns:ahyp="http://schemas.microsoft.com/office/drawing/2018/hyperlinkcolor" val="tx"/>
-                    </a:ext>
-                  </a:extLst>
-                </a:hlinkClick>
-              </a:rPr>
-              <a:t>Creative Commons Attribution-</a:t>
-            </a:r>
-            <a:r>
-              <a:rPr lang="en-US" sz="1100" dirty="0" err="1">
-                <a:latin typeface="source sans pro" panose="020B0503030403020204" pitchFamily="34" charset="0"/>
-                <a:hlinkClick r:id="rId5">
-                  <a:extLst>
-                    <a:ext uri="{A12FA001-AC4F-418D-AE19-62706E023703}">
-                      <ahyp:hlinkClr xmlns:ahyp="http://schemas.microsoft.com/office/drawing/2018/hyperlinkcolor" val="tx"/>
-                    </a:ext>
-                  </a:extLst>
-                </a:hlinkClick>
-              </a:rPr>
-              <a:t>ShareAlike</a:t>
-            </a:r>
-            <a:r>
-              <a:rPr lang="en-US" sz="1100" dirty="0">
-                <a:latin typeface="source sans pro" panose="020B0503030403020204" pitchFamily="34" charset="0"/>
-                <a:hlinkClick r:id="rId5">
-                  <a:extLst>
-                    <a:ext uri="{A12FA001-AC4F-418D-AE19-62706E023703}">
-                      <ahyp:hlinkClr xmlns:ahyp="http://schemas.microsoft.com/office/drawing/2018/hyperlinkcolor" val="tx"/>
-                    </a:ext>
-                  </a:extLst>
-                </a:hlinkClick>
-              </a:rPr>
-              <a:t> 4.0 International License</a:t>
-            </a:r>
-            <a:r>
-              <a:rPr lang="en-US" sz="1100" dirty="0">
-                <a:latin typeface="source sans pro" panose="020B0503030403020204" pitchFamily="34" charset="0"/>
-              </a:rPr>
-              <a:t>.</a:t>
-            </a:r>
-            <a:endParaRPr lang="en-US" sz="1100" dirty="0"/>
-          </a:p>
-        </p:txBody>
-      </p:sp>
+        </p:grpSpPr>
+        <p:pic>
+          <p:nvPicPr>
+            <p:cNvPr id="3" name="Picture 4" descr="Creative Commons License">
+              <a:extLst>
+                <a:ext uri="{FF2B5EF4-FFF2-40B4-BE49-F238E27FC236}">
+                  <a16:creationId xmlns:a16="http://schemas.microsoft.com/office/drawing/2014/main" id="{3D155F94-C047-8CEE-2E27-3047EEFD060E}"/>
+                </a:ext>
+              </a:extLst>
+            </p:cNvPr>
+            <p:cNvPicPr>
+              <a:picLocks noChangeAspect="1" noChangeArrowheads="1"/>
+            </p:cNvPicPr>
+            <p:nvPr/>
+          </p:nvPicPr>
+          <p:blipFill>
+            <a:blip r:embed="rId4">
+              <a:extLst>
+                <a:ext uri="{28A0092B-C50C-407E-A947-70E740481C1C}">
+                  <a14:useLocalDpi xmlns:a14="http://schemas.microsoft.com/office/drawing/2010/main" val="0"/>
+                </a:ext>
+              </a:extLst>
+            </a:blip>
+            <a:srcRect/>
+            <a:stretch>
+              <a:fillRect/>
+            </a:stretch>
+          </p:blipFill>
+          <p:spPr bwMode="auto">
+            <a:xfrm>
+              <a:off x="468312" y="6240005"/>
+              <a:ext cx="838200" cy="295275"/>
+            </a:xfrm>
+            <a:prstGeom prst="rect">
+              <a:avLst/>
+            </a:prstGeom>
+            <a:noFill/>
+            <a:extLst>
+              <a:ext uri="{909E8E84-426E-40DD-AFC4-6F175D3DCCD1}">
+                <a14:hiddenFill xmlns:a14="http://schemas.microsoft.com/office/drawing/2010/main">
+                  <a:solidFill>
+                    <a:srgbClr val="FFFFFF"/>
+                  </a:solidFill>
+                </a14:hiddenFill>
+              </a:ext>
+            </a:extLst>
+          </p:spPr>
+        </p:pic>
+        <p:sp>
+          <p:nvSpPr>
+            <p:cNvPr id="4" name="TextBox 3">
+              <a:extLst>
+                <a:ext uri="{FF2B5EF4-FFF2-40B4-BE49-F238E27FC236}">
+                  <a16:creationId xmlns:a16="http://schemas.microsoft.com/office/drawing/2014/main" id="{8817F148-9C6D-7783-69AB-3A3B6F5E2CAD}"/>
+                </a:ext>
+              </a:extLst>
+            </p:cNvPr>
+            <p:cNvSpPr txBox="1"/>
+            <p:nvPr/>
+          </p:nvSpPr>
+          <p:spPr>
+            <a:xfrm>
+              <a:off x="1268520" y="6172200"/>
+              <a:ext cx="3017521" cy="430887"/>
+            </a:xfrm>
+            <a:prstGeom prst="rect">
+              <a:avLst/>
+            </a:prstGeom>
+            <a:noFill/>
+          </p:spPr>
+          <p:txBody>
+            <a:bodyPr wrap="square">
+              <a:spAutoFit/>
+            </a:bodyPr>
+            <a:lstStyle/>
+            <a:p>
+              <a:pPr>
+                <a:spcAft>
+                  <a:spcPts val="600"/>
+                </a:spcAft>
+              </a:pPr>
+              <a:r>
+                <a:rPr lang="en-US" sz="1100" dirty="0">
+                  <a:latin typeface="+mj-lt"/>
+                </a:rPr>
+                <a:t>This work is licensed under a </a:t>
+              </a:r>
+              <a:r>
+                <a:rPr lang="en-US" sz="1100" dirty="0">
+                  <a:latin typeface="+mj-lt"/>
+                  <a:hlinkClick r:id="rId5">
+                    <a:extLst>
+                      <a:ext uri="{A12FA001-AC4F-418D-AE19-62706E023703}">
+                        <ahyp:hlinkClr xmlns:ahyp="http://schemas.microsoft.com/office/drawing/2018/hyperlinkcolor" val="tx"/>
+                      </a:ext>
+                    </a:extLst>
+                  </a:hlinkClick>
+                </a:rPr>
+                <a:t>Creative Commons Attribution-</a:t>
+              </a:r>
+              <a:r>
+                <a:rPr lang="en-US" sz="1100" dirty="0" err="1">
+                  <a:latin typeface="+mj-lt"/>
+                  <a:hlinkClick r:id="rId5">
+                    <a:extLst>
+                      <a:ext uri="{A12FA001-AC4F-418D-AE19-62706E023703}">
+                        <ahyp:hlinkClr xmlns:ahyp="http://schemas.microsoft.com/office/drawing/2018/hyperlinkcolor" val="tx"/>
+                      </a:ext>
+                    </a:extLst>
+                  </a:hlinkClick>
+                </a:rPr>
+                <a:t>ShareAlike</a:t>
+              </a:r>
+              <a:r>
+                <a:rPr lang="en-US" sz="1100" dirty="0">
+                  <a:latin typeface="+mj-lt"/>
+                  <a:hlinkClick r:id="rId5">
+                    <a:extLst>
+                      <a:ext uri="{A12FA001-AC4F-418D-AE19-62706E023703}">
+                        <ahyp:hlinkClr xmlns:ahyp="http://schemas.microsoft.com/office/drawing/2018/hyperlinkcolor" val="tx"/>
+                      </a:ext>
+                    </a:extLst>
+                  </a:hlinkClick>
+                </a:rPr>
+                <a:t> 4.0 International License</a:t>
+              </a:r>
+              <a:r>
+                <a:rPr lang="en-US" sz="1100" dirty="0">
+                  <a:latin typeface="+mj-lt"/>
+                </a:rPr>
+                <a:t>.</a:t>
+              </a:r>
+            </a:p>
+          </p:txBody>
+        </p:sp>
+      </p:grpSp>
       <p:cxnSp>
         <p:nvCxnSpPr>
           <p:cNvPr id="8" name="Straight Connector 7">

</xml_diff>